<commit_message>
Update before make it better
</commit_message>
<xml_diff>
--- a/images/profile.pptx
+++ b/images/profile.pptx
@@ -6,6 +6,7 @@
   </p:sldMasterIdLst>
   <p:sldIdLst>
     <p:sldId id="256" r:id="rId2"/>
+    <p:sldId id="257" r:id="rId3"/>
   </p:sldIdLst>
   <p:sldSz cx="12192000" cy="6858000"/>
   <p:notesSz cx="6858000" cy="9144000"/>
@@ -259,7 +260,7 @@
           <a:p>
             <a:fld id="{11E73200-A4BC-DF49-B0A0-2A48F6CE2543}" type="datetimeFigureOut">
               <a:rPr lang="en-US" smtClean="0"/>
-              <a:t>10/18/19</a:t>
+              <a:t>11/3/19</a:t>
             </a:fld>
             <a:endParaRPr lang="en-US"/>
           </a:p>
@@ -457,7 +458,7 @@
           <a:p>
             <a:fld id="{11E73200-A4BC-DF49-B0A0-2A48F6CE2543}" type="datetimeFigureOut">
               <a:rPr lang="en-US" smtClean="0"/>
-              <a:t>10/18/19</a:t>
+              <a:t>11/3/19</a:t>
             </a:fld>
             <a:endParaRPr lang="en-US"/>
           </a:p>
@@ -665,7 +666,7 @@
           <a:p>
             <a:fld id="{11E73200-A4BC-DF49-B0A0-2A48F6CE2543}" type="datetimeFigureOut">
               <a:rPr lang="en-US" smtClean="0"/>
-              <a:t>10/18/19</a:t>
+              <a:t>11/3/19</a:t>
             </a:fld>
             <a:endParaRPr lang="en-US"/>
           </a:p>
@@ -863,7 +864,7 @@
           <a:p>
             <a:fld id="{11E73200-A4BC-DF49-B0A0-2A48F6CE2543}" type="datetimeFigureOut">
               <a:rPr lang="en-US" smtClean="0"/>
-              <a:t>10/18/19</a:t>
+              <a:t>11/3/19</a:t>
             </a:fld>
             <a:endParaRPr lang="en-US"/>
           </a:p>
@@ -1138,7 +1139,7 @@
           <a:p>
             <a:fld id="{11E73200-A4BC-DF49-B0A0-2A48F6CE2543}" type="datetimeFigureOut">
               <a:rPr lang="en-US" smtClean="0"/>
-              <a:t>10/18/19</a:t>
+              <a:t>11/3/19</a:t>
             </a:fld>
             <a:endParaRPr lang="en-US"/>
           </a:p>
@@ -1403,7 +1404,7 @@
           <a:p>
             <a:fld id="{11E73200-A4BC-DF49-B0A0-2A48F6CE2543}" type="datetimeFigureOut">
               <a:rPr lang="en-US" smtClean="0"/>
-              <a:t>10/18/19</a:t>
+              <a:t>11/3/19</a:t>
             </a:fld>
             <a:endParaRPr lang="en-US"/>
           </a:p>
@@ -1815,7 +1816,7 @@
           <a:p>
             <a:fld id="{11E73200-A4BC-DF49-B0A0-2A48F6CE2543}" type="datetimeFigureOut">
               <a:rPr lang="en-US" smtClean="0"/>
-              <a:t>10/18/19</a:t>
+              <a:t>11/3/19</a:t>
             </a:fld>
             <a:endParaRPr lang="en-US"/>
           </a:p>
@@ -1956,7 +1957,7 @@
           <a:p>
             <a:fld id="{11E73200-A4BC-DF49-B0A0-2A48F6CE2543}" type="datetimeFigureOut">
               <a:rPr lang="en-US" smtClean="0"/>
-              <a:t>10/18/19</a:t>
+              <a:t>11/3/19</a:t>
             </a:fld>
             <a:endParaRPr lang="en-US"/>
           </a:p>
@@ -2069,7 +2070,7 @@
           <a:p>
             <a:fld id="{11E73200-A4BC-DF49-B0A0-2A48F6CE2543}" type="datetimeFigureOut">
               <a:rPr lang="en-US" smtClean="0"/>
-              <a:t>10/18/19</a:t>
+              <a:t>11/3/19</a:t>
             </a:fld>
             <a:endParaRPr lang="en-US"/>
           </a:p>
@@ -2380,7 +2381,7 @@
           <a:p>
             <a:fld id="{11E73200-A4BC-DF49-B0A0-2A48F6CE2543}" type="datetimeFigureOut">
               <a:rPr lang="en-US" smtClean="0"/>
-              <a:t>10/18/19</a:t>
+              <a:t>11/3/19</a:t>
             </a:fld>
             <a:endParaRPr lang="en-US"/>
           </a:p>
@@ -2668,7 +2669,7 @@
           <a:p>
             <a:fld id="{11E73200-A4BC-DF49-B0A0-2A48F6CE2543}" type="datetimeFigureOut">
               <a:rPr lang="en-US" smtClean="0"/>
-              <a:t>10/18/19</a:t>
+              <a:t>11/3/19</a:t>
             </a:fld>
             <a:endParaRPr lang="en-US"/>
           </a:p>
@@ -2909,7 +2910,7 @@
           <a:p>
             <a:fld id="{11E73200-A4BC-DF49-B0A0-2A48F6CE2543}" type="datetimeFigureOut">
               <a:rPr lang="en-US" smtClean="0"/>
-              <a:t>10/18/19</a:t>
+              <a:t>11/3/19</a:t>
             </a:fld>
             <a:endParaRPr lang="en-US"/>
           </a:p>
@@ -3368,6 +3369,380 @@
 </p:sld>
 </file>
 
+<file path=ppt/slides/slide2.xml><?xml version="1.0" encoding="utf-8"?>
+<p:sld xmlns:a="http://schemas.openxmlformats.org/drawingml/2006/main" xmlns:r="http://schemas.openxmlformats.org/officeDocument/2006/relationships" xmlns:p="http://schemas.openxmlformats.org/presentationml/2006/main">
+  <p:cSld>
+    <p:spTree>
+      <p:nvGrpSpPr>
+        <p:cNvPr id="1" name=""/>
+        <p:cNvGrpSpPr/>
+        <p:nvPr/>
+      </p:nvGrpSpPr>
+      <p:grpSpPr>
+        <a:xfrm>
+          <a:off x="0" y="0"/>
+          <a:ext cx="0" cy="0"/>
+          <a:chOff x="0" y="0"/>
+          <a:chExt cx="0" cy="0"/>
+        </a:xfrm>
+      </p:grpSpPr>
+      <p:pic>
+        <p:nvPicPr>
+          <p:cNvPr id="1026" name="Picture 2">
+            <a:extLst>
+              <a:ext uri="{FF2B5EF4-FFF2-40B4-BE49-F238E27FC236}">
+                <a16:creationId xmlns:a16="http://schemas.microsoft.com/office/drawing/2014/main" id="{89D3EEF3-A41F-2748-A14A-589F482A7604}"/>
+              </a:ext>
+            </a:extLst>
+          </p:cNvPr>
+          <p:cNvPicPr>
+            <a:picLocks noChangeAspect="1" noChangeArrowheads="1"/>
+          </p:cNvPicPr>
+          <p:nvPr/>
+        </p:nvPicPr>
+        <p:blipFill>
+          <a:blip r:embed="rId2">
+            <a:extLst>
+              <a:ext uri="{28A0092B-C50C-407E-A947-70E740481C1C}">
+                <a14:useLocalDpi xmlns:a14="http://schemas.microsoft.com/office/drawing/2010/main" val="0"/>
+              </a:ext>
+            </a:extLst>
+          </a:blip>
+          <a:srcRect/>
+          <a:stretch>
+            <a:fillRect/>
+          </a:stretch>
+        </p:blipFill>
+        <p:spPr bwMode="auto">
+          <a:xfrm>
+            <a:off x="2603500" y="375681"/>
+            <a:ext cx="2743200" cy="2743200"/>
+          </a:xfrm>
+          <a:prstGeom prst="rect">
+            <a:avLst/>
+          </a:prstGeom>
+          <a:noFill/>
+          <a:extLst>
+            <a:ext uri="{909E8E84-426E-40DD-AFC4-6F175D3DCCD1}">
+              <a14:hiddenFill xmlns:a14="http://schemas.microsoft.com/office/drawing/2010/main">
+                <a:solidFill>
+                  <a:srgbClr val="FFFFFF"/>
+                </a:solidFill>
+              </a14:hiddenFill>
+            </a:ext>
+          </a:extLst>
+        </p:spPr>
+      </p:pic>
+      <p:sp>
+        <p:nvSpPr>
+          <p:cNvPr id="6" name="TextBox 5">
+            <a:extLst>
+              <a:ext uri="{FF2B5EF4-FFF2-40B4-BE49-F238E27FC236}">
+                <a16:creationId xmlns:a16="http://schemas.microsoft.com/office/drawing/2014/main" id="{97002E05-D482-8947-A48B-D95B65FEBD42}"/>
+              </a:ext>
+            </a:extLst>
+          </p:cNvPr>
+          <p:cNvSpPr txBox="1"/>
+          <p:nvPr/>
+        </p:nvSpPr>
+        <p:spPr>
+          <a:xfrm>
+            <a:off x="2603499" y="368300"/>
+            <a:ext cx="2225675" cy="307777"/>
+          </a:xfrm>
+          <a:prstGeom prst="rect">
+            <a:avLst/>
+          </a:prstGeom>
+          <a:noFill/>
+        </p:spPr>
+        <p:txBody>
+          <a:bodyPr wrap="square" rtlCol="0">
+            <a:spAutoFit/>
+          </a:bodyPr>
+          <a:lstStyle/>
+          <a:p>
+            <a:r>
+              <a:rPr lang="en-US" sz="1400" dirty="0">
+                <a:highlight>
+                  <a:srgbClr val="FFFF00"/>
+                </a:highlight>
+              </a:rPr>
+              <a:t>Bicubic noise-free</a:t>
+            </a:r>
+          </a:p>
+        </p:txBody>
+      </p:sp>
+      <p:pic>
+        <p:nvPicPr>
+          <p:cNvPr id="1028" name="Picture 4">
+            <a:extLst>
+              <a:ext uri="{FF2B5EF4-FFF2-40B4-BE49-F238E27FC236}">
+                <a16:creationId xmlns:a16="http://schemas.microsoft.com/office/drawing/2014/main" id="{62D3A3F0-AECC-2141-A355-0CD476ED1D13}"/>
+              </a:ext>
+            </a:extLst>
+          </p:cNvPr>
+          <p:cNvPicPr>
+            <a:picLocks noChangeAspect="1" noChangeArrowheads="1"/>
+          </p:cNvPicPr>
+          <p:nvPr/>
+        </p:nvPicPr>
+        <p:blipFill>
+          <a:blip r:embed="rId3">
+            <a:extLst>
+              <a:ext uri="{28A0092B-C50C-407E-A947-70E740481C1C}">
+                <a14:useLocalDpi xmlns:a14="http://schemas.microsoft.com/office/drawing/2010/main" val="0"/>
+              </a:ext>
+            </a:extLst>
+          </a:blip>
+          <a:srcRect/>
+          <a:stretch>
+            <a:fillRect/>
+          </a:stretch>
+        </p:blipFill>
+        <p:spPr bwMode="auto">
+          <a:xfrm>
+            <a:off x="5346697" y="375681"/>
+            <a:ext cx="2743200" cy="2743200"/>
+          </a:xfrm>
+          <a:prstGeom prst="rect">
+            <a:avLst/>
+          </a:prstGeom>
+          <a:noFill/>
+          <a:extLst>
+            <a:ext uri="{909E8E84-426E-40DD-AFC4-6F175D3DCCD1}">
+              <a14:hiddenFill xmlns:a14="http://schemas.microsoft.com/office/drawing/2010/main">
+                <a:solidFill>
+                  <a:srgbClr val="FFFFFF"/>
+                </a:solidFill>
+              </a14:hiddenFill>
+            </a:ext>
+          </a:extLst>
+        </p:spPr>
+      </p:pic>
+      <p:sp>
+        <p:nvSpPr>
+          <p:cNvPr id="15" name="TextBox 14">
+            <a:extLst>
+              <a:ext uri="{FF2B5EF4-FFF2-40B4-BE49-F238E27FC236}">
+                <a16:creationId xmlns:a16="http://schemas.microsoft.com/office/drawing/2014/main" id="{96E7033A-E099-C745-B838-7FDF650E6B7A}"/>
+              </a:ext>
+            </a:extLst>
+          </p:cNvPr>
+          <p:cNvSpPr txBox="1"/>
+          <p:nvPr/>
+        </p:nvSpPr>
+        <p:spPr>
+          <a:xfrm>
+            <a:off x="5346700" y="368300"/>
+            <a:ext cx="2225675" cy="307777"/>
+          </a:xfrm>
+          <a:prstGeom prst="rect">
+            <a:avLst/>
+          </a:prstGeom>
+          <a:noFill/>
+        </p:spPr>
+        <p:txBody>
+          <a:bodyPr wrap="square" rtlCol="0">
+            <a:spAutoFit/>
+          </a:bodyPr>
+          <a:lstStyle/>
+          <a:p>
+            <a:r>
+              <a:rPr lang="en-US" sz="1400" dirty="0">
+                <a:highlight>
+                  <a:srgbClr val="FFFF00"/>
+                </a:highlight>
+              </a:rPr>
+              <a:t>Bicubic noised</a:t>
+            </a:r>
+          </a:p>
+        </p:txBody>
+      </p:sp>
+      <p:pic>
+        <p:nvPicPr>
+          <p:cNvPr id="1030" name="Picture 6">
+            <a:extLst>
+              <a:ext uri="{FF2B5EF4-FFF2-40B4-BE49-F238E27FC236}">
+                <a16:creationId xmlns:a16="http://schemas.microsoft.com/office/drawing/2014/main" id="{4BC466E4-F50D-BE4F-A1FA-B25DDBEEF6B9}"/>
+              </a:ext>
+            </a:extLst>
+          </p:cNvPr>
+          <p:cNvPicPr>
+            <a:picLocks noChangeAspect="1" noChangeArrowheads="1"/>
+          </p:cNvPicPr>
+          <p:nvPr/>
+        </p:nvPicPr>
+        <p:blipFill>
+          <a:blip r:embed="rId4">
+            <a:extLst>
+              <a:ext uri="{28A0092B-C50C-407E-A947-70E740481C1C}">
+                <a14:useLocalDpi xmlns:a14="http://schemas.microsoft.com/office/drawing/2010/main" val="0"/>
+              </a:ext>
+            </a:extLst>
+          </a:blip>
+          <a:srcRect/>
+          <a:stretch>
+            <a:fillRect/>
+          </a:stretch>
+        </p:blipFill>
+        <p:spPr bwMode="auto">
+          <a:xfrm>
+            <a:off x="2603497" y="3391931"/>
+            <a:ext cx="2743200" cy="2743200"/>
+          </a:xfrm>
+          <a:prstGeom prst="rect">
+            <a:avLst/>
+          </a:prstGeom>
+          <a:noFill/>
+          <a:extLst>
+            <a:ext uri="{909E8E84-426E-40DD-AFC4-6F175D3DCCD1}">
+              <a14:hiddenFill xmlns:a14="http://schemas.microsoft.com/office/drawing/2010/main">
+                <a:solidFill>
+                  <a:srgbClr val="FFFFFF"/>
+                </a:solidFill>
+              </a14:hiddenFill>
+            </a:ext>
+          </a:extLst>
+        </p:spPr>
+      </p:pic>
+      <p:sp>
+        <p:nvSpPr>
+          <p:cNvPr id="16" name="TextBox 15">
+            <a:extLst>
+              <a:ext uri="{FF2B5EF4-FFF2-40B4-BE49-F238E27FC236}">
+                <a16:creationId xmlns:a16="http://schemas.microsoft.com/office/drawing/2014/main" id="{1224F8FB-C686-2A4F-9AEC-16AD5E430598}"/>
+              </a:ext>
+            </a:extLst>
+          </p:cNvPr>
+          <p:cNvSpPr txBox="1"/>
+          <p:nvPr/>
+        </p:nvSpPr>
+        <p:spPr>
+          <a:xfrm>
+            <a:off x="2603498" y="3377169"/>
+            <a:ext cx="2225675" cy="307777"/>
+          </a:xfrm>
+          <a:prstGeom prst="rect">
+            <a:avLst/>
+          </a:prstGeom>
+          <a:noFill/>
+        </p:spPr>
+        <p:txBody>
+          <a:bodyPr wrap="square" rtlCol="0">
+            <a:spAutoFit/>
+          </a:bodyPr>
+          <a:lstStyle/>
+          <a:p>
+            <a:r>
+              <a:rPr lang="en-US" sz="1400" dirty="0">
+                <a:highlight>
+                  <a:srgbClr val="FFFF00"/>
+                </a:highlight>
+              </a:rPr>
+              <a:t>Proposed noise-free</a:t>
+            </a:r>
+          </a:p>
+        </p:txBody>
+      </p:sp>
+      <p:pic>
+        <p:nvPicPr>
+          <p:cNvPr id="1032" name="Picture 8">
+            <a:extLst>
+              <a:ext uri="{FF2B5EF4-FFF2-40B4-BE49-F238E27FC236}">
+                <a16:creationId xmlns:a16="http://schemas.microsoft.com/office/drawing/2014/main" id="{880185D9-3E2F-9741-8E57-3C996F2212B1}"/>
+              </a:ext>
+            </a:extLst>
+          </p:cNvPr>
+          <p:cNvPicPr>
+            <a:picLocks noChangeAspect="1" noChangeArrowheads="1"/>
+          </p:cNvPicPr>
+          <p:nvPr/>
+        </p:nvPicPr>
+        <p:blipFill>
+          <a:blip r:embed="rId5">
+            <a:extLst>
+              <a:ext uri="{28A0092B-C50C-407E-A947-70E740481C1C}">
+                <a14:useLocalDpi xmlns:a14="http://schemas.microsoft.com/office/drawing/2010/main" val="0"/>
+              </a:ext>
+            </a:extLst>
+          </a:blip>
+          <a:srcRect/>
+          <a:stretch>
+            <a:fillRect/>
+          </a:stretch>
+        </p:blipFill>
+        <p:spPr bwMode="auto">
+          <a:xfrm>
+            <a:off x="5346697" y="3391931"/>
+            <a:ext cx="2743200" cy="2743200"/>
+          </a:xfrm>
+          <a:prstGeom prst="rect">
+            <a:avLst/>
+          </a:prstGeom>
+          <a:noFill/>
+          <a:extLst>
+            <a:ext uri="{909E8E84-426E-40DD-AFC4-6F175D3DCCD1}">
+              <a14:hiddenFill xmlns:a14="http://schemas.microsoft.com/office/drawing/2010/main">
+                <a:solidFill>
+                  <a:srgbClr val="FFFFFF"/>
+                </a:solidFill>
+              </a14:hiddenFill>
+            </a:ext>
+          </a:extLst>
+        </p:spPr>
+      </p:pic>
+      <p:sp>
+        <p:nvSpPr>
+          <p:cNvPr id="17" name="TextBox 16">
+            <a:extLst>
+              <a:ext uri="{FF2B5EF4-FFF2-40B4-BE49-F238E27FC236}">
+                <a16:creationId xmlns:a16="http://schemas.microsoft.com/office/drawing/2014/main" id="{1B868DF6-094A-6C4F-93A6-DDE92A0A8E67}"/>
+              </a:ext>
+            </a:extLst>
+          </p:cNvPr>
+          <p:cNvSpPr txBox="1"/>
+          <p:nvPr/>
+        </p:nvSpPr>
+        <p:spPr>
+          <a:xfrm>
+            <a:off x="5346698" y="3377169"/>
+            <a:ext cx="2225675" cy="307777"/>
+          </a:xfrm>
+          <a:prstGeom prst="rect">
+            <a:avLst/>
+          </a:prstGeom>
+          <a:noFill/>
+        </p:spPr>
+        <p:txBody>
+          <a:bodyPr wrap="square" rtlCol="0">
+            <a:spAutoFit/>
+          </a:bodyPr>
+          <a:lstStyle/>
+          <a:p>
+            <a:r>
+              <a:rPr lang="en-US" sz="1400" dirty="0">
+                <a:highlight>
+                  <a:srgbClr val="FFFF00"/>
+                </a:highlight>
+              </a:rPr>
+              <a:t>Proposed noised</a:t>
+            </a:r>
+          </a:p>
+        </p:txBody>
+      </p:sp>
+    </p:spTree>
+    <p:extLst>
+      <p:ext uri="{BB962C8B-B14F-4D97-AF65-F5344CB8AC3E}">
+        <p14:creationId xmlns:p14="http://schemas.microsoft.com/office/powerpoint/2010/main" val="2996871696"/>
+      </p:ext>
+    </p:extLst>
+  </p:cSld>
+  <p:clrMapOvr>
+    <a:masterClrMapping/>
+  </p:clrMapOvr>
+</p:sld>
+</file>
+
 <file path=ppt/theme/theme1.xml><?xml version="1.0" encoding="utf-8"?>
 <a:theme xmlns:a="http://schemas.openxmlformats.org/drawingml/2006/main" name="Office Theme">
   <a:themeElements>

</xml_diff>